<commit_message>
updated ppt for archiving
</commit_message>
<xml_diff>
--- a/Building an HBM Lecture 2.pptx
+++ b/Building an HBM Lecture 2.pptx
@@ -234,7 +234,7 @@
           <a:p>
             <a:fld id="{7704D9BC-6083-AF44-9B4E-7E847143E5E8}" type="datetimeFigureOut">
               <a:rPr lang="en-US" smtClean="0"/>
-              <a:t>9/20/17</a:t>
+              <a:t>10/6/17</a:t>
             </a:fld>
             <a:endParaRPr lang="en-US" dirty="0"/>
           </a:p>
@@ -400,7 +400,7 @@
           <a:p>
             <a:fld id="{80838FAD-B168-794F-8E6F-752F9ED186C6}" type="datetimeFigureOut">
               <a:rPr lang="en-US" smtClean="0"/>
-              <a:t>9/20/17</a:t>
+              <a:t>10/6/17</a:t>
             </a:fld>
             <a:endParaRPr lang="en-US" dirty="0"/>
           </a:p>
@@ -1062,12 +1062,20 @@
           <a:lstStyle/>
           <a:p>
             <a:r>
-              <a:rPr lang="en-US" dirty="0" smtClean="0"/>
-              <a:t>H</a:t>
-            </a:r>
-            <a:r>
               <a:rPr lang="en-US" baseline="0" dirty="0" smtClean="0"/>
-              <a:t> may be bias but this is symmetric so results wouldn't change.  </a:t>
+              <a:t>h </a:t>
+            </a:r>
+            <a:r>
+              <a:rPr lang="en-US" baseline="0" dirty="0" smtClean="0"/>
+              <a:t>may be </a:t>
+            </a:r>
+            <a:r>
+              <a:rPr lang="en-US" baseline="0" dirty="0" smtClean="0"/>
+              <a:t>biased </a:t>
+            </a:r>
+            <a:r>
+              <a:rPr lang="en-US" baseline="0" dirty="0" smtClean="0"/>
+              <a:t>but this is symmetric so results wouldn't change.  </a:t>
             </a:r>
             <a:endParaRPr lang="en-US" dirty="0"/>
           </a:p>
@@ -1155,11 +1163,15 @@
           <a:p>
             <a:r>
               <a:rPr lang="en-US" dirty="0" smtClean="0"/>
-              <a:t>Its</a:t>
+              <a:t>It’s</a:t>
             </a:r>
             <a:r>
               <a:rPr lang="en-US" baseline="0" dirty="0" smtClean="0"/>
-              <a:t> both consistent with one and two component models.  </a:t>
+              <a:t> </a:t>
+            </a:r>
+            <a:r>
+              <a:rPr lang="en-US" baseline="0" dirty="0" smtClean="0"/>
+              <a:t>both consistent with one and two component models.  </a:t>
             </a:r>
             <a:endParaRPr lang="en-US" dirty="0"/>
           </a:p>
@@ -16381,11 +16393,18 @@
           </a:p>
           <a:p>
             <a:r>
+              <a:rPr lang="en-US" dirty="0">
+                <a:latin typeface="Helvetica"/>
+                <a:cs typeface="Helvetica"/>
+              </a:rPr>
+              <a:t>F</a:t>
+            </a:r>
+            <a:r>
               <a:rPr lang="en-US" dirty="0" smtClean="0">
                 <a:latin typeface="Helvetica"/>
                 <a:cs typeface="Helvetica"/>
               </a:rPr>
-              <a:t>Need to further test model assumptions</a:t>
+              <a:t>urther tests of model assumptions</a:t>
             </a:r>
           </a:p>
           <a:p>
@@ -16431,11 +16450,18 @@
           <a:p>
             <a:pPr lvl="1"/>
             <a:r>
+              <a:rPr lang="en-US" dirty="0">
+                <a:latin typeface="Helvetica"/>
+                <a:cs typeface="Helvetica"/>
+              </a:rPr>
+              <a:t>T</a:t>
+            </a:r>
+            <a:r>
               <a:rPr lang="en-US" dirty="0" smtClean="0">
                 <a:latin typeface="Helvetica"/>
                 <a:cs typeface="Helvetica"/>
               </a:rPr>
-              <a:t>Currently treating eccentricity distribution as separable from mass-radius distribution</a:t>
+              <a:t>reating eccentricity distribution as separable from mass-radius distribution</a:t>
             </a:r>
           </a:p>
           <a:p>

</xml_diff>